<commit_message>
update source code structure
</commit_message>
<xml_diff>
--- a/trunk/design/source_code_structure.pptx
+++ b/trunk/design/source_code_structure.pptx
@@ -5,22 +5,21 @@
     <p:sldMasterId id="2147483782" r:id="rId1"/>
   </p:sldMasterIdLst>
   <p:notesMasterIdLst>
-    <p:notesMasterId r:id="rId7"/>
+    <p:notesMasterId r:id="rId6"/>
   </p:notesMasterIdLst>
   <p:handoutMasterIdLst>
-    <p:handoutMasterId r:id="rId8"/>
+    <p:handoutMasterId r:id="rId7"/>
   </p:handoutMasterIdLst>
   <p:sldIdLst>
     <p:sldId id="256" r:id="rId2"/>
     <p:sldId id="301" r:id="rId3"/>
-    <p:sldId id="302" r:id="rId4"/>
-    <p:sldId id="274" r:id="rId5"/>
-    <p:sldId id="275" r:id="rId6"/>
+    <p:sldId id="274" r:id="rId4"/>
+    <p:sldId id="275" r:id="rId5"/>
   </p:sldIdLst>
   <p:sldSz cx="9144000" cy="5143500" type="screen16x9"/>
   <p:notesSz cx="6858000" cy="9144000"/>
   <p:custDataLst>
-    <p:tags r:id="rId9"/>
+    <p:tags r:id="rId8"/>
   </p:custDataLst>
   <p:defaultTextStyle>
     <a:defPPr>
@@ -260,7 +259,7 @@
             <a:pPr>
               <a:defRPr/>
             </a:pPr>
-            <a:fld id="{02304080-0A6B-466F-96A6-F6EB940D2E45}" type="datetimeFigureOut">
+            <a:fld id="{8AD6FA12-8E5B-45E3-8251-3F2677A32DFD}" type="datetimeFigureOut">
               <a:rPr lang="en-US"/>
               <a:pPr>
                 <a:defRPr/>
@@ -353,7 +352,7 @@
             <a:pPr>
               <a:defRPr/>
             </a:pPr>
-            <a:fld id="{59F37949-5908-4EE6-8880-6E29F8457287}" type="slidenum">
+            <a:fld id="{573ECB5A-19CF-4B48-9BD6-CB441E8958AA}" type="slidenum">
               <a:rPr lang="en-US"/>
               <a:pPr>
                 <a:defRPr/>
@@ -674,7 +673,7 @@
       </p:grpSpPr>
       <p:sp>
         <p:nvSpPr>
-          <p:cNvPr id="14337" name="Slide Image Placeholder 1"/>
+          <p:cNvPr id="15361" name="Slide Image Placeholder 1"/>
           <p:cNvSpPr>
             <a:spLocks noGrp="1" noRot="1" noChangeAspect="1"/>
           </p:cNvSpPr>
@@ -986,7 +985,7 @@
               </a:spcAft>
               <a:defRPr/>
             </a:pPr>
-            <a:fld id="{387FF5A5-3B8B-48CA-9D86-7574A0A3F6EF}" type="slidenum">
+            <a:fld id="{4E3D3F46-ACF2-4855-A6F8-B4FF2B113AE1}" type="slidenum">
               <a:rPr lang="en-US" sz="800">
                 <a:solidFill>
                   <a:prstClr val="white">
@@ -6537,7 +6536,7 @@
               </a:spcAft>
               <a:defRPr/>
             </a:pPr>
-            <a:fld id="{44DD9C92-F8C9-477C-9C84-1AD87A696515}" type="slidenum">
+            <a:fld id="{3EBF42D5-5BB2-4354-A38B-B9D010C8424B}" type="slidenum">
               <a:rPr lang="en-US" sz="800">
                 <a:solidFill>
                   <a:prstClr val="white">
@@ -16218,7 +16217,7 @@
               </a:spcAft>
               <a:defRPr/>
             </a:pPr>
-            <a:fld id="{B658C86D-A9E5-410F-89A4-02B4EDBCB71F}" type="slidenum">
+            <a:fld id="{F7BAF3F0-C77A-469F-8333-B9DFD7E6163F}" type="slidenum">
               <a:rPr lang="en-US" sz="800">
                 <a:solidFill>
                   <a:prstClr val="white">
@@ -21138,7 +21137,7 @@
               </a:spcAft>
               <a:defRPr/>
             </a:pPr>
-            <a:fld id="{4333947C-E426-4B14-AF58-7599E65A2C17}" type="slidenum">
+            <a:fld id="{4A79BACB-4F51-4873-8595-05F08005AA34}" type="slidenum">
               <a:rPr lang="en-US" sz="800">
                 <a:solidFill>
                   <a:srgbClr val="414141">
@@ -25712,15 +25711,15 @@
   <p:clrMap bg1="lt1" tx1="dk1" bg2="lt2" tx2="dk2" accent1="accent1" accent2="accent2" accent3="accent3" accent4="accent4" accent5="accent5" accent6="accent6" hlink="hlink" folHlink="folHlink"/>
   <p:sldLayoutIdLst>
     <p:sldLayoutId id="2147483793" r:id="rId1"/>
-    <p:sldLayoutId id="2147483789" r:id="rId2"/>
+    <p:sldLayoutId id="2147483792" r:id="rId2"/>
     <p:sldLayoutId id="2147483794" r:id="rId3"/>
-    <p:sldLayoutId id="2147483790" r:id="rId4"/>
-    <p:sldLayoutId id="2147483791" r:id="rId5"/>
+    <p:sldLayoutId id="2147483791" r:id="rId4"/>
+    <p:sldLayoutId id="2147483790" r:id="rId5"/>
     <p:sldLayoutId id="2147483795" r:id="rId6"/>
     <p:sldLayoutId id="2147483796" r:id="rId7"/>
     <p:sldLayoutId id="2147483797" r:id="rId8"/>
     <p:sldLayoutId id="2147483798" r:id="rId9"/>
-    <p:sldLayoutId id="2147483792" r:id="rId10"/>
+    <p:sldLayoutId id="2147483789" r:id="rId10"/>
   </p:sldLayoutIdLst>
   <p:hf hdr="0" ftr="0"/>
   <p:txStyles>
@@ -26153,12 +26152,10 @@
           <a:bodyPr/>
           <a:lstStyle/>
           <a:p>
-            <a:pPr eaLnBrk="1" hangingPunct="1">
-              <a:defRPr/>
-            </a:pPr>
+            <a:pPr eaLnBrk="1" hangingPunct="1"/>
             <a:r>
               <a:rPr lang="en-US" altLang="en-US" smtClean="0"/>
-              <a:t>Source Code Structure</a:t>
+              <a:t>Simulator - Source Code Structure</a:t>
             </a:r>
             <a:endParaRPr lang="en-US" smtClean="0"/>
           </a:p>
@@ -26166,7 +26163,7 @@
       </p:sp>
       <p:sp>
         <p:nvSpPr>
-          <p:cNvPr id="13315" name="Text Placeholder 19"/>
+          <p:cNvPr id="14338" name="Text Placeholder 19"/>
           <p:cNvSpPr>
             <a:spLocks noGrp="1"/>
           </p:cNvSpPr>
@@ -26246,1045 +26243,7 @@
       </p:grpSpPr>
       <p:sp>
         <p:nvSpPr>
-          <p:cNvPr id="15364" name="Oval 4"/>
-          <p:cNvSpPr>
-            <a:spLocks noChangeArrowheads="1"/>
-          </p:cNvSpPr>
-          <p:nvPr/>
-        </p:nvSpPr>
-        <p:spPr bwMode="auto">
-          <a:xfrm>
-            <a:off x="641350" y="938213"/>
-            <a:ext cx="1031875" cy="393700"/>
-          </a:xfrm>
-          <a:prstGeom prst="ellipse">
-            <a:avLst/>
-          </a:prstGeom>
-          <a:noFill/>
-          <a:ln w="9525">
-            <a:solidFill>
-              <a:schemeClr val="tx1"/>
-            </a:solidFill>
-            <a:round/>
-            <a:headEnd/>
-            <a:tailEnd/>
-          </a:ln>
-          <a:effectLst/>
-        </p:spPr>
-        <p:txBody>
-          <a:bodyPr wrap="none" anchor="ctr"/>
-          <a:lstStyle/>
-          <a:p>
-            <a:pPr algn="ctr" defTabSz="914400"/>
-            <a:r>
-              <a:rPr lang="en-US" sz="1200"/>
-              <a:t>Begin</a:t>
-            </a:r>
-          </a:p>
-        </p:txBody>
-      </p:sp>
-      <p:sp>
-        <p:nvSpPr>
-          <p:cNvPr id="15366" name="Oval 6"/>
-          <p:cNvSpPr>
-            <a:spLocks noChangeArrowheads="1"/>
-          </p:cNvSpPr>
-          <p:nvPr/>
-        </p:nvSpPr>
-        <p:spPr bwMode="auto">
-          <a:xfrm>
-            <a:off x="6943725" y="3914775"/>
-            <a:ext cx="1200150" cy="603250"/>
-          </a:xfrm>
-          <a:prstGeom prst="ellipse">
-            <a:avLst/>
-          </a:prstGeom>
-          <a:noFill/>
-          <a:ln w="9525">
-            <a:solidFill>
-              <a:schemeClr val="tx1"/>
-            </a:solidFill>
-            <a:round/>
-            <a:headEnd/>
-            <a:tailEnd/>
-          </a:ln>
-          <a:effectLst/>
-        </p:spPr>
-        <p:txBody>
-          <a:bodyPr wrap="none" anchor="ctr"/>
-          <a:lstStyle/>
-          <a:p>
-            <a:pPr algn="ctr" defTabSz="914400"/>
-            <a:r>
-              <a:rPr lang="en-US" sz="1200"/>
-              <a:t>Display</a:t>
-            </a:r>
-          </a:p>
-        </p:txBody>
-      </p:sp>
-      <p:sp>
-        <p:nvSpPr>
-          <p:cNvPr id="15369" name="AutoShape 9"/>
-          <p:cNvSpPr>
-            <a:spLocks noChangeArrowheads="1"/>
-          </p:cNvSpPr>
-          <p:nvPr/>
-        </p:nvSpPr>
-        <p:spPr bwMode="auto">
-          <a:xfrm>
-            <a:off x="158750" y="4178300"/>
-            <a:ext cx="1879600" cy="244475"/>
-          </a:xfrm>
-          <a:prstGeom prst="roundRect">
-            <a:avLst>
-              <a:gd name="adj" fmla="val 16667"/>
-            </a:avLst>
-          </a:prstGeom>
-          <a:noFill/>
-          <a:ln w="9525">
-            <a:solidFill>
-              <a:schemeClr val="tx1"/>
-            </a:solidFill>
-            <a:round/>
-            <a:headEnd/>
-            <a:tailEnd/>
-          </a:ln>
-          <a:effectLst/>
-        </p:spPr>
-        <p:txBody>
-          <a:bodyPr wrap="none" anchor="ctr"/>
-          <a:lstStyle/>
-          <a:p>
-            <a:pPr algn="ctr" defTabSz="914400"/>
-            <a:r>
-              <a:rPr lang="en-US" sz="800"/>
-              <a:t>output$recommend &lt;- renderValueBox()</a:t>
-            </a:r>
-          </a:p>
-        </p:txBody>
-      </p:sp>
-      <p:sp>
-        <p:nvSpPr>
-          <p:cNvPr id="15374" name="AutoShape 14"/>
-          <p:cNvSpPr>
-            <a:spLocks noChangeArrowheads="1"/>
-          </p:cNvSpPr>
-          <p:nvPr/>
-        </p:nvSpPr>
-        <p:spPr bwMode="auto">
-          <a:xfrm>
-            <a:off x="190500" y="3327400"/>
-            <a:ext cx="1879600" cy="244475"/>
-          </a:xfrm>
-          <a:prstGeom prst="roundRect">
-            <a:avLst>
-              <a:gd name="adj" fmla="val 16667"/>
-            </a:avLst>
-          </a:prstGeom>
-          <a:noFill/>
-          <a:ln w="9525">
-            <a:solidFill>
-              <a:schemeClr val="tx1"/>
-            </a:solidFill>
-            <a:round/>
-            <a:headEnd/>
-            <a:tailEnd/>
-          </a:ln>
-          <a:effectLst/>
-        </p:spPr>
-        <p:txBody>
-          <a:bodyPr wrap="none" anchor="ctr"/>
-          <a:lstStyle/>
-          <a:p>
-            <a:pPr algn="ctr" defTabSz="914400"/>
-            <a:r>
-              <a:rPr lang="en-US" sz="1100"/>
-              <a:t>output$distPlot &lt;- renderPlot()</a:t>
-            </a:r>
-          </a:p>
-        </p:txBody>
-      </p:sp>
-      <p:sp>
-        <p:nvSpPr>
-          <p:cNvPr id="15377" name="AutoShape 17"/>
-          <p:cNvSpPr>
-            <a:spLocks noChangeArrowheads="1"/>
-          </p:cNvSpPr>
-          <p:nvPr/>
-        </p:nvSpPr>
-        <p:spPr bwMode="auto">
-          <a:xfrm>
-            <a:off x="2471738" y="3602038"/>
-            <a:ext cx="1879600" cy="244475"/>
-          </a:xfrm>
-          <a:prstGeom prst="roundRect">
-            <a:avLst>
-              <a:gd name="adj" fmla="val 16667"/>
-            </a:avLst>
-          </a:prstGeom>
-          <a:noFill/>
-          <a:ln w="9525">
-            <a:solidFill>
-              <a:schemeClr val="tx1"/>
-            </a:solidFill>
-            <a:round/>
-            <a:headEnd/>
-            <a:tailEnd/>
-          </a:ln>
-          <a:effectLst/>
-        </p:spPr>
-        <p:txBody>
-          <a:bodyPr wrap="none" anchor="ctr"/>
-          <a:lstStyle/>
-          <a:p>
-            <a:pPr algn="ctr" defTabSz="914400"/>
-            <a:r>
-              <a:rPr lang="en-US" sz="1200"/>
-              <a:t>do.judgement()</a:t>
-            </a:r>
-          </a:p>
-        </p:txBody>
-      </p:sp>
-      <p:sp>
-        <p:nvSpPr>
-          <p:cNvPr id="15378" name="AutoShape 18"/>
-          <p:cNvSpPr>
-            <a:spLocks noChangeArrowheads="1"/>
-          </p:cNvSpPr>
-          <p:nvPr/>
-        </p:nvSpPr>
-        <p:spPr bwMode="auto">
-          <a:xfrm>
-            <a:off x="2446338" y="2232025"/>
-            <a:ext cx="1879600" cy="244475"/>
-          </a:xfrm>
-          <a:prstGeom prst="roundRect">
-            <a:avLst>
-              <a:gd name="adj" fmla="val 16667"/>
-            </a:avLst>
-          </a:prstGeom>
-          <a:noFill/>
-          <a:ln w="9525">
-            <a:solidFill>
-              <a:schemeClr val="tx1"/>
-            </a:solidFill>
-            <a:round/>
-            <a:headEnd/>
-            <a:tailEnd/>
-          </a:ln>
-          <a:effectLst/>
-        </p:spPr>
-        <p:txBody>
-          <a:bodyPr wrap="none" anchor="ctr"/>
-          <a:lstStyle/>
-          <a:p>
-            <a:pPr algn="ctr" defTabSz="914400"/>
-            <a:r>
-              <a:rPr lang="en-US" sz="1200"/>
-              <a:t>recalc.risk()</a:t>
-            </a:r>
-          </a:p>
-        </p:txBody>
-      </p:sp>
-      <p:sp>
-        <p:nvSpPr>
-          <p:cNvPr id="15379" name="AutoShape 19"/>
-          <p:cNvSpPr>
-            <a:spLocks noChangeArrowheads="1"/>
-          </p:cNvSpPr>
-          <p:nvPr/>
-        </p:nvSpPr>
-        <p:spPr bwMode="auto">
-          <a:xfrm>
-            <a:off x="2438400" y="4110038"/>
-            <a:ext cx="1879600" cy="244475"/>
-          </a:xfrm>
-          <a:prstGeom prst="roundRect">
-            <a:avLst>
-              <a:gd name="adj" fmla="val 16667"/>
-            </a:avLst>
-          </a:prstGeom>
-          <a:noFill/>
-          <a:ln w="9525">
-            <a:solidFill>
-              <a:schemeClr val="tx1"/>
-            </a:solidFill>
-            <a:round/>
-            <a:headEnd/>
-            <a:tailEnd/>
-          </a:ln>
-          <a:effectLst/>
-        </p:spPr>
-        <p:txBody>
-          <a:bodyPr wrap="none" anchor="ctr"/>
-          <a:lstStyle/>
-          <a:p>
-            <a:pPr algn="ctr" defTabSz="914400"/>
-            <a:r>
-              <a:rPr lang="en-US" sz="1000"/>
-              <a:t>output$comment &lt;- renderPrint</a:t>
-            </a:r>
-            <a:r>
-              <a:rPr lang="en-US" altLang="ja-JP" sz="1000"/>
-              <a:t>()</a:t>
-            </a:r>
-            <a:endParaRPr lang="en-US" sz="1000"/>
-          </a:p>
-        </p:txBody>
-      </p:sp>
-      <p:sp>
-        <p:nvSpPr>
-          <p:cNvPr id="15380" name="AutoShape 20"/>
-          <p:cNvSpPr>
-            <a:spLocks noChangeArrowheads="1"/>
-          </p:cNvSpPr>
-          <p:nvPr/>
-        </p:nvSpPr>
-        <p:spPr bwMode="auto">
-          <a:xfrm>
-            <a:off x="206375" y="2486025"/>
-            <a:ext cx="1879600" cy="244475"/>
-          </a:xfrm>
-          <a:prstGeom prst="roundRect">
-            <a:avLst>
-              <a:gd name="adj" fmla="val 16667"/>
-            </a:avLst>
-          </a:prstGeom>
-          <a:noFill/>
-          <a:ln w="9525">
-            <a:solidFill>
-              <a:schemeClr val="tx1"/>
-            </a:solidFill>
-            <a:round/>
-            <a:headEnd/>
-            <a:tailEnd/>
-          </a:ln>
-          <a:effectLst/>
-        </p:spPr>
-        <p:txBody>
-          <a:bodyPr wrap="none" anchor="ctr"/>
-          <a:lstStyle/>
-          <a:p>
-            <a:pPr algn="ctr" defTabSz="914400"/>
-            <a:r>
-              <a:rPr lang="en-US" sz="1200"/>
-              <a:t>datasetInput &lt;- reactive()</a:t>
-            </a:r>
-          </a:p>
-        </p:txBody>
-      </p:sp>
-      <p:sp>
-        <p:nvSpPr>
-          <p:cNvPr id="15381" name="AutoShape 21"/>
-          <p:cNvSpPr>
-            <a:spLocks noChangeArrowheads="1"/>
-          </p:cNvSpPr>
-          <p:nvPr/>
-        </p:nvSpPr>
-        <p:spPr bwMode="auto">
-          <a:xfrm>
-            <a:off x="215900" y="2011363"/>
-            <a:ext cx="1879600" cy="244475"/>
-          </a:xfrm>
-          <a:prstGeom prst="roundRect">
-            <a:avLst>
-              <a:gd name="adj" fmla="val 16667"/>
-            </a:avLst>
-          </a:prstGeom>
-          <a:noFill/>
-          <a:ln w="9525">
-            <a:solidFill>
-              <a:schemeClr val="tx1"/>
-            </a:solidFill>
-            <a:round/>
-            <a:headEnd/>
-            <a:tailEnd/>
-          </a:ln>
-          <a:effectLst/>
-        </p:spPr>
-        <p:txBody>
-          <a:bodyPr wrap="none" anchor="ctr"/>
-          <a:lstStyle/>
-          <a:p>
-            <a:pPr algn="ctr" defTabSz="914400"/>
-            <a:r>
-              <a:rPr lang="en-US" sz="1200"/>
-              <a:t>updatedParam &lt;- reactive</a:t>
-            </a:r>
-          </a:p>
-        </p:txBody>
-      </p:sp>
-      <p:sp>
-        <p:nvSpPr>
-          <p:cNvPr id="15382" name="AutoShape 22"/>
-          <p:cNvSpPr>
-            <a:spLocks noChangeArrowheads="1"/>
-          </p:cNvSpPr>
-          <p:nvPr/>
-        </p:nvSpPr>
-        <p:spPr bwMode="auto">
-          <a:xfrm>
-            <a:off x="188913" y="2898775"/>
-            <a:ext cx="1879600" cy="244475"/>
-          </a:xfrm>
-          <a:prstGeom prst="roundRect">
-            <a:avLst>
-              <a:gd name="adj" fmla="val 16667"/>
-            </a:avLst>
-          </a:prstGeom>
-          <a:noFill/>
-          <a:ln w="9525">
-            <a:solidFill>
-              <a:schemeClr val="tx1"/>
-            </a:solidFill>
-            <a:round/>
-            <a:headEnd/>
-            <a:tailEnd/>
-          </a:ln>
-          <a:effectLst/>
-        </p:spPr>
-        <p:txBody>
-          <a:bodyPr wrap="none" anchor="ctr"/>
-          <a:lstStyle/>
-          <a:p>
-            <a:pPr algn="ctr" defTabSz="914400"/>
-            <a:r>
-              <a:rPr lang="en-US" sz="1100"/>
-              <a:t> datasetRiskProfile &lt;- reactive</a:t>
-            </a:r>
-            <a:r>
-              <a:rPr lang="en-US" altLang="ja-JP" sz="1100"/>
-              <a:t>()</a:t>
-            </a:r>
-            <a:endParaRPr lang="en-US" sz="1100"/>
-          </a:p>
-        </p:txBody>
-      </p:sp>
-      <p:sp>
-        <p:nvSpPr>
-          <p:cNvPr id="15383" name="AutoShape 23"/>
-          <p:cNvSpPr>
-            <a:spLocks noChangeArrowheads="1"/>
-          </p:cNvSpPr>
-          <p:nvPr/>
-        </p:nvSpPr>
-        <p:spPr bwMode="auto">
-          <a:xfrm>
-            <a:off x="2446338" y="1755775"/>
-            <a:ext cx="1879600" cy="244475"/>
-          </a:xfrm>
-          <a:prstGeom prst="roundRect">
-            <a:avLst>
-              <a:gd name="adj" fmla="val 16667"/>
-            </a:avLst>
-          </a:prstGeom>
-          <a:noFill/>
-          <a:ln w="9525">
-            <a:solidFill>
-              <a:schemeClr val="tx1"/>
-            </a:solidFill>
-            <a:round/>
-            <a:headEnd/>
-            <a:tailEnd/>
-          </a:ln>
-          <a:effectLst/>
-        </p:spPr>
-        <p:txBody>
-          <a:bodyPr wrap="none" anchor="ctr"/>
-          <a:lstStyle/>
-          <a:p>
-            <a:pPr algn="ctr" defTabSz="914400"/>
-            <a:r>
-              <a:rPr lang="en-US" sz="1200"/>
-              <a:t>recalc.days()</a:t>
-            </a:r>
-          </a:p>
-        </p:txBody>
-      </p:sp>
-      <p:sp>
-        <p:nvSpPr>
-          <p:cNvPr id="15384" name="AutoShape 24"/>
-          <p:cNvSpPr>
-            <a:spLocks noChangeArrowheads="1"/>
-          </p:cNvSpPr>
-          <p:nvPr/>
-        </p:nvSpPr>
-        <p:spPr bwMode="auto">
-          <a:xfrm>
-            <a:off x="166688" y="3744913"/>
-            <a:ext cx="1879600" cy="244475"/>
-          </a:xfrm>
-          <a:prstGeom prst="roundRect">
-            <a:avLst>
-              <a:gd name="adj" fmla="val 16667"/>
-            </a:avLst>
-          </a:prstGeom>
-          <a:noFill/>
-          <a:ln w="9525">
-            <a:solidFill>
-              <a:schemeClr val="tx1"/>
-            </a:solidFill>
-            <a:round/>
-            <a:headEnd/>
-            <a:tailEnd/>
-          </a:ln>
-          <a:effectLst/>
-        </p:spPr>
-        <p:txBody>
-          <a:bodyPr wrap="none" anchor="ctr"/>
-          <a:lstStyle/>
-          <a:p>
-            <a:pPr algn="ctr" defTabSz="914400"/>
-            <a:r>
-              <a:rPr lang="en-US" sz="1000"/>
-              <a:t>output$ratio &lt;- renderValueBox</a:t>
-            </a:r>
-            <a:r>
-              <a:rPr lang="en-US" sz="1200"/>
-              <a:t>()</a:t>
-            </a:r>
-          </a:p>
-        </p:txBody>
-      </p:sp>
-      <p:sp>
-        <p:nvSpPr>
-          <p:cNvPr id="15386" name="AutoShape 26"/>
-          <p:cNvSpPr>
-            <a:spLocks noChangeArrowheads="1"/>
-          </p:cNvSpPr>
-          <p:nvPr/>
-        </p:nvSpPr>
-        <p:spPr bwMode="auto">
-          <a:xfrm>
-            <a:off x="217488" y="1527175"/>
-            <a:ext cx="1879600" cy="244475"/>
-          </a:xfrm>
-          <a:prstGeom prst="roundRect">
-            <a:avLst>
-              <a:gd name="adj" fmla="val 16667"/>
-            </a:avLst>
-          </a:prstGeom>
-          <a:noFill/>
-          <a:ln w="9525">
-            <a:solidFill>
-              <a:schemeClr val="tx1"/>
-            </a:solidFill>
-            <a:round/>
-            <a:headEnd/>
-            <a:tailEnd/>
-          </a:ln>
-          <a:effectLst/>
-        </p:spPr>
-        <p:txBody>
-          <a:bodyPr wrap="none" anchor="ctr"/>
-          <a:lstStyle/>
-          <a:p>
-            <a:pPr algn="ctr" defTabSz="914400"/>
-            <a:r>
-              <a:rPr lang="en-US" sz="1200"/>
-              <a:t>checkboxOut&lt;-renderPrint()</a:t>
-            </a:r>
-          </a:p>
-        </p:txBody>
-      </p:sp>
-      <p:sp>
-        <p:nvSpPr>
-          <p:cNvPr id="15387" name="Line 27"/>
-          <p:cNvSpPr>
-            <a:spLocks noChangeShapeType="1"/>
-          </p:cNvSpPr>
-          <p:nvPr/>
-        </p:nvSpPr>
-        <p:spPr bwMode="auto">
-          <a:xfrm>
-            <a:off x="1116013" y="1336675"/>
-            <a:ext cx="0" cy="182563"/>
-          </a:xfrm>
-          <a:prstGeom prst="line">
-            <a:avLst/>
-          </a:prstGeom>
-          <a:noFill/>
-          <a:ln w="9525">
-            <a:solidFill>
-              <a:schemeClr val="tx1"/>
-            </a:solidFill>
-            <a:round/>
-            <a:headEnd/>
-            <a:tailEnd type="triangle" w="med" len="med"/>
-          </a:ln>
-          <a:effectLst/>
-        </p:spPr>
-        <p:txBody>
-          <a:bodyPr/>
-          <a:lstStyle/>
-          <a:p>
-            <a:endParaRPr lang="en-US"/>
-          </a:p>
-        </p:txBody>
-      </p:sp>
-      <p:sp>
-        <p:nvSpPr>
-          <p:cNvPr id="15388" name="Line 28"/>
-          <p:cNvSpPr>
-            <a:spLocks noChangeShapeType="1"/>
-          </p:cNvSpPr>
-          <p:nvPr/>
-        </p:nvSpPr>
-        <p:spPr bwMode="auto">
-          <a:xfrm>
-            <a:off x="1116013" y="1812925"/>
-            <a:ext cx="0" cy="182563"/>
-          </a:xfrm>
-          <a:prstGeom prst="line">
-            <a:avLst/>
-          </a:prstGeom>
-          <a:noFill/>
-          <a:ln w="9525">
-            <a:solidFill>
-              <a:schemeClr val="tx1"/>
-            </a:solidFill>
-            <a:round/>
-            <a:headEnd/>
-            <a:tailEnd type="triangle" w="med" len="med"/>
-          </a:ln>
-          <a:effectLst/>
-        </p:spPr>
-        <p:txBody>
-          <a:bodyPr/>
-          <a:lstStyle/>
-          <a:p>
-            <a:endParaRPr lang="en-US"/>
-          </a:p>
-        </p:txBody>
-      </p:sp>
-      <p:sp>
-        <p:nvSpPr>
-          <p:cNvPr id="15389" name="Line 29"/>
-          <p:cNvSpPr>
-            <a:spLocks noChangeShapeType="1"/>
-          </p:cNvSpPr>
-          <p:nvPr/>
-        </p:nvSpPr>
-        <p:spPr bwMode="auto">
-          <a:xfrm>
-            <a:off x="1125538" y="2270125"/>
-            <a:ext cx="0" cy="182563"/>
-          </a:xfrm>
-          <a:prstGeom prst="line">
-            <a:avLst/>
-          </a:prstGeom>
-          <a:noFill/>
-          <a:ln w="9525">
-            <a:solidFill>
-              <a:schemeClr val="tx1"/>
-            </a:solidFill>
-            <a:round/>
-            <a:headEnd/>
-            <a:tailEnd type="triangle" w="med" len="med"/>
-          </a:ln>
-          <a:effectLst/>
-        </p:spPr>
-        <p:txBody>
-          <a:bodyPr/>
-          <a:lstStyle/>
-          <a:p>
-            <a:endParaRPr lang="en-US"/>
-          </a:p>
-        </p:txBody>
-      </p:sp>
-      <p:sp>
-        <p:nvSpPr>
-          <p:cNvPr id="15390" name="Line 30"/>
-          <p:cNvSpPr>
-            <a:spLocks noChangeShapeType="1"/>
-          </p:cNvSpPr>
-          <p:nvPr/>
-        </p:nvSpPr>
-        <p:spPr bwMode="auto">
-          <a:xfrm flipV="1">
-            <a:off x="2074863" y="1855788"/>
-            <a:ext cx="365125" cy="574675"/>
-          </a:xfrm>
-          <a:prstGeom prst="line">
-            <a:avLst/>
-          </a:prstGeom>
-          <a:noFill/>
-          <a:ln w="9525">
-            <a:solidFill>
-              <a:schemeClr val="tx1"/>
-            </a:solidFill>
-            <a:round/>
-            <a:headEnd type="triangle" w="med" len="med"/>
-            <a:tailEnd type="triangle" w="med" len="med"/>
-          </a:ln>
-          <a:effectLst/>
-        </p:spPr>
-        <p:txBody>
-          <a:bodyPr/>
-          <a:lstStyle/>
-          <a:p>
-            <a:endParaRPr lang="en-US"/>
-          </a:p>
-        </p:txBody>
-      </p:sp>
-      <p:sp>
-        <p:nvSpPr>
-          <p:cNvPr id="15391" name="Line 31"/>
-          <p:cNvSpPr>
-            <a:spLocks noChangeShapeType="1"/>
-          </p:cNvSpPr>
-          <p:nvPr/>
-        </p:nvSpPr>
-        <p:spPr bwMode="auto">
-          <a:xfrm flipV="1">
-            <a:off x="2097088" y="2397125"/>
-            <a:ext cx="327025" cy="209550"/>
-          </a:xfrm>
-          <a:prstGeom prst="line">
-            <a:avLst/>
-          </a:prstGeom>
-          <a:noFill/>
-          <a:ln w="9525">
-            <a:solidFill>
-              <a:schemeClr val="tx1"/>
-            </a:solidFill>
-            <a:round/>
-            <a:headEnd type="triangle" w="med" len="med"/>
-            <a:tailEnd type="triangle" w="med" len="med"/>
-          </a:ln>
-          <a:effectLst/>
-        </p:spPr>
-        <p:txBody>
-          <a:bodyPr/>
-          <a:lstStyle/>
-          <a:p>
-            <a:endParaRPr lang="en-US"/>
-          </a:p>
-        </p:txBody>
-      </p:sp>
-      <p:sp>
-        <p:nvSpPr>
-          <p:cNvPr id="15392" name="Line 32"/>
-          <p:cNvSpPr>
-            <a:spLocks noChangeShapeType="1"/>
-          </p:cNvSpPr>
-          <p:nvPr/>
-        </p:nvSpPr>
-        <p:spPr bwMode="auto">
-          <a:xfrm>
-            <a:off x="1125538" y="2727325"/>
-            <a:ext cx="0" cy="182563"/>
-          </a:xfrm>
-          <a:prstGeom prst="line">
-            <a:avLst/>
-          </a:prstGeom>
-          <a:noFill/>
-          <a:ln w="9525">
-            <a:solidFill>
-              <a:schemeClr val="tx1"/>
-            </a:solidFill>
-            <a:round/>
-            <a:headEnd/>
-            <a:tailEnd type="triangle" w="med" len="med"/>
-          </a:ln>
-          <a:effectLst/>
-        </p:spPr>
-        <p:txBody>
-          <a:bodyPr/>
-          <a:lstStyle/>
-          <a:p>
-            <a:endParaRPr lang="en-US"/>
-          </a:p>
-        </p:txBody>
-      </p:sp>
-      <p:sp>
-        <p:nvSpPr>
-          <p:cNvPr id="15393" name="Line 33"/>
-          <p:cNvSpPr>
-            <a:spLocks noChangeShapeType="1"/>
-          </p:cNvSpPr>
-          <p:nvPr/>
-        </p:nvSpPr>
-        <p:spPr bwMode="auto">
-          <a:xfrm>
-            <a:off x="1135063" y="3138488"/>
-            <a:ext cx="0" cy="182562"/>
-          </a:xfrm>
-          <a:prstGeom prst="line">
-            <a:avLst/>
-          </a:prstGeom>
-          <a:noFill/>
-          <a:ln w="9525">
-            <a:solidFill>
-              <a:schemeClr val="tx1"/>
-            </a:solidFill>
-            <a:round/>
-            <a:headEnd/>
-            <a:tailEnd type="triangle" w="med" len="med"/>
-          </a:ln>
-          <a:effectLst/>
-        </p:spPr>
-        <p:txBody>
-          <a:bodyPr/>
-          <a:lstStyle/>
-          <a:p>
-            <a:endParaRPr lang="en-US"/>
-          </a:p>
-        </p:txBody>
-      </p:sp>
-      <p:sp>
-        <p:nvSpPr>
-          <p:cNvPr id="15396" name="Line 36"/>
-          <p:cNvSpPr>
-            <a:spLocks noChangeShapeType="1"/>
-          </p:cNvSpPr>
-          <p:nvPr/>
-        </p:nvSpPr>
-        <p:spPr bwMode="auto">
-          <a:xfrm>
-            <a:off x="1152525" y="3559175"/>
-            <a:ext cx="0" cy="182563"/>
-          </a:xfrm>
-          <a:prstGeom prst="line">
-            <a:avLst/>
-          </a:prstGeom>
-          <a:noFill/>
-          <a:ln w="9525">
-            <a:solidFill>
-              <a:schemeClr val="tx1"/>
-            </a:solidFill>
-            <a:round/>
-            <a:headEnd/>
-            <a:tailEnd type="triangle" w="med" len="med"/>
-          </a:ln>
-          <a:effectLst/>
-        </p:spPr>
-        <p:txBody>
-          <a:bodyPr/>
-          <a:lstStyle/>
-          <a:p>
-            <a:endParaRPr lang="en-US"/>
-          </a:p>
-        </p:txBody>
-      </p:sp>
-      <p:sp>
-        <p:nvSpPr>
-          <p:cNvPr id="15398" name="Line 38"/>
-          <p:cNvSpPr>
-            <a:spLocks noChangeShapeType="1"/>
-          </p:cNvSpPr>
-          <p:nvPr/>
-        </p:nvSpPr>
-        <p:spPr bwMode="auto">
-          <a:xfrm>
-            <a:off x="1133475" y="4025900"/>
-            <a:ext cx="0" cy="182563"/>
-          </a:xfrm>
-          <a:prstGeom prst="line">
-            <a:avLst/>
-          </a:prstGeom>
-          <a:noFill/>
-          <a:ln w="9525">
-            <a:solidFill>
-              <a:schemeClr val="tx1"/>
-            </a:solidFill>
-            <a:round/>
-            <a:headEnd/>
-            <a:tailEnd type="triangle" w="med" len="med"/>
-          </a:ln>
-          <a:effectLst/>
-        </p:spPr>
-        <p:txBody>
-          <a:bodyPr/>
-          <a:lstStyle/>
-          <a:p>
-            <a:endParaRPr lang="en-US"/>
-          </a:p>
-        </p:txBody>
-      </p:sp>
-      <p:sp>
-        <p:nvSpPr>
-          <p:cNvPr id="15399" name="Line 39"/>
-          <p:cNvSpPr>
-            <a:spLocks noChangeShapeType="1"/>
-          </p:cNvSpPr>
-          <p:nvPr/>
-        </p:nvSpPr>
-        <p:spPr bwMode="auto">
-          <a:xfrm flipV="1">
-            <a:off x="2057400" y="4279900"/>
-            <a:ext cx="339725" cy="9525"/>
-          </a:xfrm>
-          <a:prstGeom prst="line">
-            <a:avLst/>
-          </a:prstGeom>
-          <a:noFill/>
-          <a:ln w="9525">
-            <a:solidFill>
-              <a:schemeClr val="tx1"/>
-            </a:solidFill>
-            <a:round/>
-            <a:headEnd/>
-            <a:tailEnd type="triangle" w="med" len="med"/>
-          </a:ln>
-          <a:effectLst/>
-        </p:spPr>
-        <p:txBody>
-          <a:bodyPr/>
-          <a:lstStyle/>
-          <a:p>
-            <a:endParaRPr lang="en-US"/>
-          </a:p>
-        </p:txBody>
-      </p:sp>
-      <p:sp>
-        <p:nvSpPr>
-          <p:cNvPr id="15400" name="Line 40"/>
-          <p:cNvSpPr>
-            <a:spLocks noChangeShapeType="1"/>
-          </p:cNvSpPr>
-          <p:nvPr/>
-        </p:nvSpPr>
-        <p:spPr bwMode="auto">
-          <a:xfrm flipV="1">
-            <a:off x="4364038" y="4224338"/>
-            <a:ext cx="2614612" cy="11112"/>
-          </a:xfrm>
-          <a:prstGeom prst="line">
-            <a:avLst/>
-          </a:prstGeom>
-          <a:noFill/>
-          <a:ln w="9525">
-            <a:solidFill>
-              <a:schemeClr val="tx1"/>
-            </a:solidFill>
-            <a:round/>
-            <a:headEnd/>
-            <a:tailEnd type="triangle" w="med" len="med"/>
-          </a:ln>
-          <a:effectLst/>
-        </p:spPr>
-        <p:txBody>
-          <a:bodyPr/>
-          <a:lstStyle/>
-          <a:p>
-            <a:endParaRPr lang="en-US"/>
-          </a:p>
-        </p:txBody>
-      </p:sp>
-      <p:sp>
-        <p:nvSpPr>
-          <p:cNvPr id="15401" name="Line 41"/>
-          <p:cNvSpPr>
-            <a:spLocks noChangeShapeType="1"/>
-          </p:cNvSpPr>
-          <p:nvPr/>
-        </p:nvSpPr>
-        <p:spPr bwMode="auto">
-          <a:xfrm>
-            <a:off x="3238500" y="3883025"/>
-            <a:ext cx="0" cy="266700"/>
-          </a:xfrm>
-          <a:prstGeom prst="line">
-            <a:avLst/>
-          </a:prstGeom>
-          <a:noFill/>
-          <a:ln w="9525">
-            <a:solidFill>
-              <a:schemeClr val="tx1"/>
-            </a:solidFill>
-            <a:round/>
-            <a:headEnd type="triangle" w="med" len="med"/>
-            <a:tailEnd type="triangle" w="med" len="med"/>
-          </a:ln>
-          <a:effectLst/>
-        </p:spPr>
-        <p:txBody>
-          <a:bodyPr/>
-          <a:lstStyle/>
-          <a:p>
-            <a:endParaRPr lang="en-US"/>
-          </a:p>
-        </p:txBody>
-      </p:sp>
-      <p:sp>
-        <p:nvSpPr>
-          <p:cNvPr id="15402" name="AutoShape 42"/>
-          <p:cNvSpPr>
-            <a:spLocks noChangeArrowheads="1"/>
-          </p:cNvSpPr>
-          <p:nvPr/>
-        </p:nvSpPr>
-        <p:spPr bwMode="auto">
-          <a:xfrm>
-            <a:off x="2560638" y="2779713"/>
-            <a:ext cx="1701800" cy="493712"/>
-          </a:xfrm>
-          <a:prstGeom prst="diamond">
-            <a:avLst/>
-          </a:prstGeom>
-          <a:noFill/>
-          <a:ln w="9525">
-            <a:solidFill>
-              <a:schemeClr val="tx1"/>
-            </a:solidFill>
-            <a:miter lim="800000"/>
-            <a:headEnd/>
-            <a:tailEnd/>
-          </a:ln>
-          <a:effectLst/>
-        </p:spPr>
-        <p:txBody>
-          <a:bodyPr wrap="none" anchor="ctr"/>
-          <a:lstStyle/>
-          <a:p>
-            <a:pPr algn="ctr" defTabSz="914400"/>
-            <a:r>
-              <a:rPr lang="en-US" altLang="ja-JP" sz="1200"/>
-              <a:t>Input from UI</a:t>
-            </a:r>
-            <a:endParaRPr lang="en-US" sz="1200"/>
-          </a:p>
-        </p:txBody>
-      </p:sp>
-      <p:sp>
-        <p:nvSpPr>
-          <p:cNvPr id="15403" name="Line 43"/>
-          <p:cNvSpPr>
-            <a:spLocks noChangeShapeType="1"/>
-          </p:cNvSpPr>
-          <p:nvPr/>
-        </p:nvSpPr>
-        <p:spPr bwMode="auto">
-          <a:xfrm flipH="1">
-            <a:off x="2066925" y="3033713"/>
-            <a:ext cx="504825" cy="1587"/>
-          </a:xfrm>
-          <a:prstGeom prst="line">
-            <a:avLst/>
-          </a:prstGeom>
-          <a:noFill/>
-          <a:ln w="9525">
-            <a:solidFill>
-              <a:schemeClr val="tx1"/>
-            </a:solidFill>
-            <a:round/>
-            <a:headEnd/>
-            <a:tailEnd type="triangle" w="med" len="med"/>
-          </a:ln>
-          <a:effectLst/>
-        </p:spPr>
-        <p:txBody>
-          <a:bodyPr/>
-          <a:lstStyle/>
-          <a:p>
-            <a:endParaRPr lang="en-US"/>
-          </a:p>
-        </p:txBody>
-      </p:sp>
-      <p:sp>
-        <p:nvSpPr>
-          <p:cNvPr id="15408" name="Rectangle 48"/>
+          <p:cNvPr id="16412" name="Rectangle 48"/>
           <p:cNvSpPr>
             <a:spLocks/>
           </p:cNvSpPr>
@@ -27316,85 +26275,15 @@
               </a:spcBef>
             </a:pPr>
             <a:r>
-              <a:rPr lang="en-US" sz="2400"/>
-              <a:t>Dashboard</a:t>
+              <a:rPr lang="en-US"/>
+              <a:t>samplecodesforGCS_20171006tosend.r</a:t>
             </a:r>
-            <a:r>
-              <a:rPr lang="en-US" altLang="ja-JP" sz="2400"/>
-              <a:t> tab</a:t>
-            </a:r>
-            <a:endParaRPr lang="en-US" sz="2400" b="1"/>
-          </a:p>
-        </p:txBody>
-      </p:sp>
-    </p:spTree>
-  </p:cSld>
-  <p:clrMapOvr>
-    <a:masterClrMapping/>
-  </p:clrMapOvr>
-  <p:timing>
-    <p:tnLst>
-      <p:par>
-        <p:cTn id="1" dur="indefinite" restart="never" nodeType="tmRoot"/>
-      </p:par>
-    </p:tnLst>
-  </p:timing>
-</p:sld>
-</file>
-
-<file path=ppt/slides/slide3.xml><?xml version="1.0" encoding="utf-8"?>
-<p:sld xmlns:a="http://schemas.openxmlformats.org/drawingml/2006/main" xmlns:r="http://schemas.openxmlformats.org/officeDocument/2006/relationships" xmlns:p="http://schemas.openxmlformats.org/presentationml/2006/main">
-  <p:cSld>
-    <p:spTree>
-      <p:nvGrpSpPr>
-        <p:cNvPr id="1" name=""/>
-        <p:cNvGrpSpPr/>
-        <p:nvPr/>
-      </p:nvGrpSpPr>
-      <p:grpSpPr>
-        <a:xfrm>
-          <a:off x="0" y="0"/>
-          <a:ext cx="0" cy="0"/>
-          <a:chOff x="0" y="0"/>
-          <a:chExt cx="0" cy="0"/>
-        </a:xfrm>
-      </p:grpSpPr>
-      <p:sp>
-        <p:nvSpPr>
-          <p:cNvPr id="24578" name="Rectangle 2"/>
-          <p:cNvSpPr>
-            <a:spLocks noGrp="1"/>
-          </p:cNvSpPr>
-          <p:nvPr>
-            <p:ph type="title"/>
-          </p:nvPr>
-        </p:nvSpPr>
-        <p:spPr>
-          <a:xfrm>
-            <a:off x="203200" y="0"/>
-            <a:ext cx="7051675" cy="733425"/>
-          </a:xfrm>
-          <a:noFill/>
-        </p:spPr>
-        <p:txBody>
-          <a:bodyPr/>
-          <a:lstStyle/>
-          <a:p>
-            <a:r>
-              <a:rPr lang="en-US" altLang="ja-JP" smtClean="0">
-                <a:latin typeface="Arial" charset="0"/>
-              </a:rPr>
-              <a:t>Raw data tab</a:t>
-            </a:r>
-            <a:endParaRPr lang="en-US" smtClean="0">
-              <a:latin typeface="Arial" charset="0"/>
-            </a:endParaRPr>
           </a:p>
         </p:txBody>
       </p:sp>
       <p:sp>
         <p:nvSpPr>
-          <p:cNvPr id="24580" name="AutoShape 4"/>
+          <p:cNvPr id="16415" name="Rectangle 31"/>
           <p:cNvSpPr>
             <a:spLocks noChangeArrowheads="1"/>
           </p:cNvSpPr>
@@ -27402,17 +26291,15 @@
         </p:nvSpPr>
         <p:spPr bwMode="auto">
           <a:xfrm>
-            <a:off x="560388" y="1985963"/>
-            <a:ext cx="1701800" cy="493712"/>
+            <a:off x="6824663" y="1028700"/>
+            <a:ext cx="1189037" cy="274638"/>
           </a:xfrm>
-          <a:prstGeom prst="diamond">
+          <a:prstGeom prst="rect">
             <a:avLst/>
           </a:prstGeom>
           <a:noFill/>
           <a:ln w="9525">
-            <a:solidFill>
-              <a:schemeClr val="tx1"/>
-            </a:solidFill>
+            <a:noFill/>
             <a:miter lim="800000"/>
             <a:headEnd/>
             <a:tailEnd/>
@@ -27420,76 +26307,31 @@
           <a:effectLst/>
         </p:spPr>
         <p:txBody>
-          <a:bodyPr wrap="none" anchor="ctr"/>
+          <a:bodyPr wrap="none">
+            <a:spAutoFit/>
+          </a:bodyPr>
           <a:lstStyle/>
           <a:p>
-            <a:pPr algn="ctr" defTabSz="914400"/>
+            <a:pPr defTabSz="914400"/>
             <a:r>
-              <a:rPr lang="en-US" altLang="ja-JP" sz="1100"/>
-              <a:t>Press “save” button</a:t>
+              <a:rPr lang="en-US" sz="1200"/>
+              <a:t>output$riskPlot</a:t>
             </a:r>
-            <a:endParaRPr lang="en-US" sz="1100"/>
           </a:p>
         </p:txBody>
       </p:sp>
       <p:sp>
         <p:nvSpPr>
-          <p:cNvPr id="24581" name="AutoShape 5"/>
-          <p:cNvSpPr>
-            <a:spLocks noChangeArrowheads="1"/>
-          </p:cNvSpPr>
-          <p:nvPr/>
-        </p:nvSpPr>
-        <p:spPr bwMode="auto">
-          <a:xfrm>
-            <a:off x="2800350" y="2101850"/>
-            <a:ext cx="1879600" cy="244475"/>
-          </a:xfrm>
-          <a:prstGeom prst="roundRect">
-            <a:avLst>
-              <a:gd name="adj" fmla="val 16667"/>
-            </a:avLst>
-          </a:prstGeom>
-          <a:noFill/>
-          <a:ln w="9525">
-            <a:solidFill>
-              <a:schemeClr val="tx1"/>
-            </a:solidFill>
-            <a:round/>
-            <a:headEnd/>
-            <a:tailEnd/>
-          </a:ln>
-          <a:effectLst/>
-        </p:spPr>
-        <p:txBody>
-          <a:bodyPr wrap="none" anchor="ctr"/>
-          <a:lstStyle/>
-          <a:p>
-            <a:pPr algn="ctr" defTabSz="914400"/>
-            <a:r>
-              <a:rPr lang="en-US" sz="1200"/>
-              <a:t>output$saved&lt;-renderPrint(</a:t>
-            </a:r>
-            <a:r>
-              <a:rPr lang="en-US" altLang="ja-JP" sz="1200"/>
-              <a:t>)</a:t>
-            </a:r>
-            <a:endParaRPr lang="en-US" sz="1200"/>
-          </a:p>
-        </p:txBody>
-      </p:sp>
-      <p:sp>
-        <p:nvSpPr>
-          <p:cNvPr id="24582" name="Line 6"/>
+          <p:cNvPr id="16417" name="Line 33"/>
           <p:cNvSpPr>
             <a:spLocks noChangeShapeType="1"/>
           </p:cNvSpPr>
           <p:nvPr/>
         </p:nvSpPr>
         <p:spPr bwMode="auto">
-          <a:xfrm>
-            <a:off x="2289175" y="2239963"/>
-            <a:ext cx="430213" cy="0"/>
+          <a:xfrm flipH="1">
+            <a:off x="7373938" y="1292225"/>
+            <a:ext cx="6350" cy="1254125"/>
           </a:xfrm>
           <a:prstGeom prst="line">
             <a:avLst/>
@@ -27515,7 +26357,7 @@
       </p:sp>
       <p:sp>
         <p:nvSpPr>
-          <p:cNvPr id="24583" name="AutoShape 7"/>
+          <p:cNvPr id="16419" name="Rectangle 35"/>
           <p:cNvSpPr>
             <a:spLocks noChangeArrowheads="1"/>
           </p:cNvSpPr>
@@ -27523,13 +26365,128 @@
         </p:nvSpPr>
         <p:spPr bwMode="auto">
           <a:xfrm>
-            <a:off x="2790825" y="1535113"/>
-            <a:ext cx="1879600" cy="244475"/>
+            <a:off x="6754813" y="2566988"/>
+            <a:ext cx="1408112" cy="274637"/>
           </a:xfrm>
-          <a:prstGeom prst="roundRect">
-            <a:avLst>
-              <a:gd name="adj" fmla="val 16667"/>
-            </a:avLst>
+          <a:prstGeom prst="rect">
+            <a:avLst/>
+          </a:prstGeom>
+          <a:noFill/>
+          <a:ln w="9525">
+            <a:noFill/>
+            <a:miter lim="800000"/>
+            <a:headEnd/>
+            <a:tailEnd/>
+          </a:ln>
+          <a:effectLst/>
+        </p:spPr>
+        <p:txBody>
+          <a:bodyPr wrap="none">
+            <a:spAutoFit/>
+          </a:bodyPr>
+          <a:lstStyle/>
+          <a:p>
+            <a:pPr defTabSz="914400"/>
+            <a:r>
+              <a:rPr lang="en-US" sz="1200"/>
+              <a:t>datasetRiskProfile</a:t>
+            </a:r>
+          </a:p>
+        </p:txBody>
+      </p:sp>
+      <p:sp>
+        <p:nvSpPr>
+          <p:cNvPr id="16420" name="Rectangle 36"/>
+          <p:cNvSpPr>
+            <a:spLocks noChangeArrowheads="1"/>
+          </p:cNvSpPr>
+          <p:nvPr/>
+        </p:nvSpPr>
+        <p:spPr bwMode="auto">
+          <a:xfrm>
+            <a:off x="2454275" y="996950"/>
+            <a:ext cx="1281113" cy="274638"/>
+          </a:xfrm>
+          <a:prstGeom prst="rect">
+            <a:avLst/>
+          </a:prstGeom>
+          <a:noFill/>
+          <a:ln w="9525">
+            <a:noFill/>
+            <a:miter lim="800000"/>
+            <a:headEnd/>
+            <a:tailEnd/>
+          </a:ln>
+          <a:effectLst/>
+        </p:spPr>
+        <p:txBody>
+          <a:bodyPr wrap="none">
+            <a:spAutoFit/>
+          </a:bodyPr>
+          <a:lstStyle/>
+          <a:p>
+            <a:pPr defTabSz="914400"/>
+            <a:r>
+              <a:rPr lang="en-US" sz="1200"/>
+              <a:t>output$premium</a:t>
+            </a:r>
+          </a:p>
+        </p:txBody>
+      </p:sp>
+      <p:sp>
+        <p:nvSpPr>
+          <p:cNvPr id="16422" name="Rectangle 38"/>
+          <p:cNvSpPr>
+            <a:spLocks noChangeArrowheads="1"/>
+          </p:cNvSpPr>
+          <p:nvPr/>
+        </p:nvSpPr>
+        <p:spPr bwMode="auto">
+          <a:xfrm>
+            <a:off x="2411413" y="1801813"/>
+            <a:ext cx="1103312" cy="274637"/>
+          </a:xfrm>
+          <a:prstGeom prst="rect">
+            <a:avLst/>
+          </a:prstGeom>
+          <a:noFill/>
+          <a:ln w="9525">
+            <a:noFill/>
+            <a:miter lim="800000"/>
+            <a:headEnd/>
+            <a:tailEnd/>
+          </a:ln>
+          <a:effectLst/>
+        </p:spPr>
+        <p:txBody>
+          <a:bodyPr wrap="none">
+            <a:spAutoFit/>
+          </a:bodyPr>
+          <a:lstStyle/>
+          <a:p>
+            <a:pPr defTabSz="914400"/>
+            <a:r>
+              <a:rPr lang="en-US" sz="1200"/>
+              <a:t>do.judgement</a:t>
+            </a:r>
+          </a:p>
+        </p:txBody>
+      </p:sp>
+      <p:sp>
+        <p:nvSpPr>
+          <p:cNvPr id="16423" name="Line 39"/>
+          <p:cNvSpPr>
+            <a:spLocks noChangeShapeType="1"/>
+          </p:cNvSpPr>
+          <p:nvPr/>
+        </p:nvSpPr>
+        <p:spPr bwMode="auto">
+          <a:xfrm>
+            <a:off x="3019425" y="1271588"/>
+            <a:ext cx="7938" cy="552450"/>
+          </a:xfrm>
+          <a:prstGeom prst="line">
+            <a:avLst/>
           </a:prstGeom>
           <a:noFill/>
           <a:ln w="9525">
@@ -27538,25 +26495,56 @@
             </a:solidFill>
             <a:round/>
             <a:headEnd/>
-            <a:tailEnd/>
+            <a:tailEnd type="triangle" w="med" len="med"/>
           </a:ln>
           <a:effectLst/>
         </p:spPr>
         <p:txBody>
-          <a:bodyPr wrap="none" anchor="ctr"/>
+          <a:bodyPr/>
           <a:lstStyle/>
           <a:p>
-            <a:pPr algn="ctr" defTabSz="914400"/>
-            <a:r>
-              <a:rPr lang="en-US" sz="1000"/>
-              <a:t>output$view&lt;-renderDataTable()</a:t>
-            </a:r>
+            <a:endParaRPr lang="en-US"/>
           </a:p>
         </p:txBody>
       </p:sp>
       <p:sp>
         <p:nvSpPr>
-          <p:cNvPr id="24584" name="Oval 8"/>
+          <p:cNvPr id="16424" name="Line 40"/>
+          <p:cNvSpPr>
+            <a:spLocks noChangeShapeType="1"/>
+          </p:cNvSpPr>
+          <p:nvPr/>
+        </p:nvSpPr>
+        <p:spPr bwMode="auto">
+          <a:xfrm>
+            <a:off x="3025775" y="2071688"/>
+            <a:ext cx="9525" cy="512762"/>
+          </a:xfrm>
+          <a:prstGeom prst="line">
+            <a:avLst/>
+          </a:prstGeom>
+          <a:noFill/>
+          <a:ln w="9525">
+            <a:solidFill>
+              <a:schemeClr val="tx1"/>
+            </a:solidFill>
+            <a:round/>
+            <a:headEnd/>
+            <a:tailEnd type="triangle" w="med" len="med"/>
+          </a:ln>
+          <a:effectLst/>
+        </p:spPr>
+        <p:txBody>
+          <a:bodyPr/>
+          <a:lstStyle/>
+          <a:p>
+            <a:endParaRPr lang="en-US"/>
+          </a:p>
+        </p:txBody>
+      </p:sp>
+      <p:sp>
+        <p:nvSpPr>
+          <p:cNvPr id="16425" name="Rectangle 41"/>
           <p:cNvSpPr>
             <a:spLocks noChangeArrowheads="1"/>
           </p:cNvSpPr>
@@ -27564,13 +26552,827 @@
         </p:nvSpPr>
         <p:spPr bwMode="auto">
           <a:xfrm>
-            <a:off x="5889625" y="1339850"/>
-            <a:ext cx="1200150" cy="603250"/>
+            <a:off x="2509838" y="2590800"/>
+            <a:ext cx="1020762" cy="274638"/>
           </a:xfrm>
-          <a:prstGeom prst="ellipse">
+          <a:prstGeom prst="rect">
             <a:avLst/>
           </a:prstGeom>
           <a:noFill/>
+          <a:ln w="9525">
+            <a:noFill/>
+            <a:miter lim="800000"/>
+            <a:headEnd/>
+            <a:tailEnd/>
+          </a:ln>
+          <a:effectLst/>
+        </p:spPr>
+        <p:txBody>
+          <a:bodyPr wrap="none">
+            <a:spAutoFit/>
+          </a:bodyPr>
+          <a:lstStyle/>
+          <a:p>
+            <a:pPr defTabSz="914400"/>
+            <a:r>
+              <a:rPr lang="en-US" sz="1200"/>
+              <a:t>datasetInput</a:t>
+            </a:r>
+          </a:p>
+        </p:txBody>
+      </p:sp>
+      <p:sp>
+        <p:nvSpPr>
+          <p:cNvPr id="16426" name="Rectangle 42"/>
+          <p:cNvSpPr>
+            <a:spLocks noChangeArrowheads="1"/>
+          </p:cNvSpPr>
+          <p:nvPr/>
+        </p:nvSpPr>
+        <p:spPr bwMode="auto">
+          <a:xfrm>
+            <a:off x="3822700" y="1022350"/>
+            <a:ext cx="1316038" cy="274638"/>
+          </a:xfrm>
+          <a:prstGeom prst="rect">
+            <a:avLst/>
+          </a:prstGeom>
+          <a:noFill/>
+          <a:ln w="9525">
+            <a:noFill/>
+            <a:miter lim="800000"/>
+            <a:headEnd/>
+            <a:tailEnd/>
+          </a:ln>
+          <a:effectLst/>
+        </p:spPr>
+        <p:txBody>
+          <a:bodyPr wrap="none">
+            <a:spAutoFit/>
+          </a:bodyPr>
+          <a:lstStyle/>
+          <a:p>
+            <a:pPr defTabSz="914400"/>
+            <a:r>
+              <a:rPr lang="en-US" sz="1200"/>
+              <a:t>output$comment</a:t>
+            </a:r>
+          </a:p>
+        </p:txBody>
+      </p:sp>
+      <p:sp>
+        <p:nvSpPr>
+          <p:cNvPr id="16427" name="Line 43"/>
+          <p:cNvSpPr>
+            <a:spLocks noChangeShapeType="1"/>
+          </p:cNvSpPr>
+          <p:nvPr/>
+        </p:nvSpPr>
+        <p:spPr bwMode="auto">
+          <a:xfrm flipH="1">
+            <a:off x="3205163" y="1285875"/>
+            <a:ext cx="1036637" cy="528638"/>
+          </a:xfrm>
+          <a:prstGeom prst="line">
+            <a:avLst/>
+          </a:prstGeom>
+          <a:noFill/>
+          <a:ln w="9525">
+            <a:solidFill>
+              <a:schemeClr val="tx1"/>
+            </a:solidFill>
+            <a:round/>
+            <a:headEnd/>
+            <a:tailEnd type="triangle" w="med" len="med"/>
+          </a:ln>
+          <a:effectLst/>
+        </p:spPr>
+        <p:txBody>
+          <a:bodyPr/>
+          <a:lstStyle/>
+          <a:p>
+            <a:endParaRPr lang="en-US"/>
+          </a:p>
+        </p:txBody>
+      </p:sp>
+      <p:sp>
+        <p:nvSpPr>
+          <p:cNvPr id="16428" name="Line 44"/>
+          <p:cNvSpPr>
+            <a:spLocks noChangeShapeType="1"/>
+          </p:cNvSpPr>
+          <p:nvPr/>
+        </p:nvSpPr>
+        <p:spPr bwMode="auto">
+          <a:xfrm flipH="1">
+            <a:off x="4300538" y="1282700"/>
+            <a:ext cx="7937" cy="504825"/>
+          </a:xfrm>
+          <a:prstGeom prst="line">
+            <a:avLst/>
+          </a:prstGeom>
+          <a:noFill/>
+          <a:ln w="9525">
+            <a:solidFill>
+              <a:schemeClr val="tx1"/>
+            </a:solidFill>
+            <a:round/>
+            <a:headEnd/>
+            <a:tailEnd type="triangle" w="med" len="med"/>
+          </a:ln>
+          <a:effectLst/>
+        </p:spPr>
+        <p:txBody>
+          <a:bodyPr/>
+          <a:lstStyle/>
+          <a:p>
+            <a:endParaRPr lang="en-US"/>
+          </a:p>
+        </p:txBody>
+      </p:sp>
+      <p:sp>
+        <p:nvSpPr>
+          <p:cNvPr id="16430" name="Rectangle 46"/>
+          <p:cNvSpPr>
+            <a:spLocks noChangeArrowheads="1"/>
+          </p:cNvSpPr>
+          <p:nvPr/>
+        </p:nvSpPr>
+        <p:spPr bwMode="auto">
+          <a:xfrm>
+            <a:off x="3598863" y="1798638"/>
+            <a:ext cx="1179512" cy="274637"/>
+          </a:xfrm>
+          <a:prstGeom prst="rect">
+            <a:avLst/>
+          </a:prstGeom>
+          <a:noFill/>
+          <a:ln w="9525">
+            <a:noFill/>
+            <a:miter lim="800000"/>
+            <a:headEnd/>
+            <a:tailEnd/>
+          </a:ln>
+          <a:effectLst/>
+        </p:spPr>
+        <p:txBody>
+          <a:bodyPr wrap="none">
+            <a:spAutoFit/>
+          </a:bodyPr>
+          <a:lstStyle/>
+          <a:p>
+            <a:pPr defTabSz="914400"/>
+            <a:r>
+              <a:rPr lang="en-US" sz="1200"/>
+              <a:t>updatedParam</a:t>
+            </a:r>
+          </a:p>
+        </p:txBody>
+      </p:sp>
+      <p:sp>
+        <p:nvSpPr>
+          <p:cNvPr id="16431" name="Rectangle 47"/>
+          <p:cNvSpPr>
+            <a:spLocks noChangeArrowheads="1"/>
+          </p:cNvSpPr>
+          <p:nvPr/>
+        </p:nvSpPr>
+        <p:spPr bwMode="auto">
+          <a:xfrm>
+            <a:off x="3871913" y="2603500"/>
+            <a:ext cx="808037" cy="274638"/>
+          </a:xfrm>
+          <a:prstGeom prst="rect">
+            <a:avLst/>
+          </a:prstGeom>
+          <a:noFill/>
+          <a:ln w="9525">
+            <a:noFill/>
+            <a:miter lim="800000"/>
+            <a:headEnd/>
+            <a:tailEnd/>
+          </a:ln>
+          <a:effectLst/>
+        </p:spPr>
+        <p:txBody>
+          <a:bodyPr wrap="none">
+            <a:spAutoFit/>
+          </a:bodyPr>
+          <a:lstStyle/>
+          <a:p>
+            <a:pPr defTabSz="914400"/>
+            <a:r>
+              <a:rPr lang="en-US" sz="1200"/>
+              <a:t>basedata</a:t>
+            </a:r>
+          </a:p>
+        </p:txBody>
+      </p:sp>
+      <p:sp>
+        <p:nvSpPr>
+          <p:cNvPr id="16432" name="Line 48"/>
+          <p:cNvSpPr>
+            <a:spLocks noChangeShapeType="1"/>
+          </p:cNvSpPr>
+          <p:nvPr/>
+        </p:nvSpPr>
+        <p:spPr bwMode="auto">
+          <a:xfrm flipH="1">
+            <a:off x="4294188" y="2052638"/>
+            <a:ext cx="1587" cy="604837"/>
+          </a:xfrm>
+          <a:prstGeom prst="line">
+            <a:avLst/>
+          </a:prstGeom>
+          <a:noFill/>
+          <a:ln w="9525">
+            <a:solidFill>
+              <a:schemeClr val="tx1"/>
+            </a:solidFill>
+            <a:round/>
+            <a:headEnd/>
+            <a:tailEnd type="triangle" w="med" len="med"/>
+          </a:ln>
+          <a:effectLst/>
+        </p:spPr>
+        <p:txBody>
+          <a:bodyPr/>
+          <a:lstStyle/>
+          <a:p>
+            <a:endParaRPr lang="en-US"/>
+          </a:p>
+        </p:txBody>
+      </p:sp>
+      <p:sp>
+        <p:nvSpPr>
+          <p:cNvPr id="16434" name="Line 50"/>
+          <p:cNvSpPr>
+            <a:spLocks noChangeShapeType="1"/>
+          </p:cNvSpPr>
+          <p:nvPr/>
+        </p:nvSpPr>
+        <p:spPr bwMode="auto">
+          <a:xfrm>
+            <a:off x="4286250" y="2884488"/>
+            <a:ext cx="0" cy="746125"/>
+          </a:xfrm>
+          <a:prstGeom prst="line">
+            <a:avLst/>
+          </a:prstGeom>
+          <a:noFill/>
+          <a:ln w="9525">
+            <a:solidFill>
+              <a:schemeClr val="tx1"/>
+            </a:solidFill>
+            <a:round/>
+            <a:headEnd/>
+            <a:tailEnd type="triangle" w="med" len="med"/>
+          </a:ln>
+          <a:effectLst/>
+        </p:spPr>
+        <p:txBody>
+          <a:bodyPr/>
+          <a:lstStyle/>
+          <a:p>
+            <a:endParaRPr lang="en-US"/>
+          </a:p>
+        </p:txBody>
+      </p:sp>
+      <p:sp>
+        <p:nvSpPr>
+          <p:cNvPr id="16435" name="Rectangle 51"/>
+          <p:cNvSpPr>
+            <a:spLocks noChangeArrowheads="1"/>
+          </p:cNvSpPr>
+          <p:nvPr/>
+        </p:nvSpPr>
+        <p:spPr bwMode="auto">
+          <a:xfrm>
+            <a:off x="4735513" y="1819275"/>
+            <a:ext cx="868362" cy="274638"/>
+          </a:xfrm>
+          <a:prstGeom prst="rect">
+            <a:avLst/>
+          </a:prstGeom>
+          <a:noFill/>
+          <a:ln w="9525">
+            <a:noFill/>
+            <a:miter lim="800000"/>
+            <a:headEnd/>
+            <a:tailEnd/>
+          </a:ln>
+          <a:effectLst/>
+        </p:spPr>
+        <p:txBody>
+          <a:bodyPr wrap="none">
+            <a:spAutoFit/>
+          </a:bodyPr>
+          <a:lstStyle/>
+          <a:p>
+            <a:pPr defTabSz="914400"/>
+            <a:r>
+              <a:rPr lang="en-US" sz="1200"/>
+              <a:t>recalc.risk</a:t>
+            </a:r>
+          </a:p>
+        </p:txBody>
+      </p:sp>
+      <p:sp>
+        <p:nvSpPr>
+          <p:cNvPr id="16441" name="Line 57"/>
+          <p:cNvSpPr>
+            <a:spLocks noChangeShapeType="1"/>
+          </p:cNvSpPr>
+          <p:nvPr/>
+        </p:nvSpPr>
+        <p:spPr bwMode="auto">
+          <a:xfrm>
+            <a:off x="4379913" y="1301750"/>
+            <a:ext cx="601662" cy="514350"/>
+          </a:xfrm>
+          <a:prstGeom prst="line">
+            <a:avLst/>
+          </a:prstGeom>
+          <a:noFill/>
+          <a:ln w="9525">
+            <a:solidFill>
+              <a:schemeClr val="tx1"/>
+            </a:solidFill>
+            <a:round/>
+            <a:headEnd/>
+            <a:tailEnd type="triangle" w="med" len="med"/>
+          </a:ln>
+          <a:effectLst/>
+        </p:spPr>
+        <p:txBody>
+          <a:bodyPr/>
+          <a:lstStyle/>
+          <a:p>
+            <a:endParaRPr lang="en-US"/>
+          </a:p>
+        </p:txBody>
+      </p:sp>
+      <p:sp>
+        <p:nvSpPr>
+          <p:cNvPr id="16442" name="Rectangle 58"/>
+          <p:cNvSpPr>
+            <a:spLocks noChangeArrowheads="1"/>
+          </p:cNvSpPr>
+          <p:nvPr/>
+        </p:nvSpPr>
+        <p:spPr bwMode="auto">
+          <a:xfrm>
+            <a:off x="5559425" y="1824038"/>
+            <a:ext cx="952500" cy="274637"/>
+          </a:xfrm>
+          <a:prstGeom prst="rect">
+            <a:avLst/>
+          </a:prstGeom>
+          <a:noFill/>
+          <a:ln w="9525">
+            <a:noFill/>
+            <a:miter lim="800000"/>
+            <a:headEnd/>
+            <a:tailEnd/>
+          </a:ln>
+          <a:effectLst/>
+        </p:spPr>
+        <p:txBody>
+          <a:bodyPr>
+            <a:spAutoFit/>
+          </a:bodyPr>
+          <a:lstStyle/>
+          <a:p>
+            <a:pPr defTabSz="914400"/>
+            <a:r>
+              <a:rPr lang="en-US" sz="1200"/>
+              <a:t>recalc.days</a:t>
+            </a:r>
+          </a:p>
+        </p:txBody>
+      </p:sp>
+      <p:sp>
+        <p:nvSpPr>
+          <p:cNvPr id="16443" name="Line 59"/>
+          <p:cNvSpPr>
+            <a:spLocks noChangeShapeType="1"/>
+          </p:cNvSpPr>
+          <p:nvPr/>
+        </p:nvSpPr>
+        <p:spPr bwMode="auto">
+          <a:xfrm>
+            <a:off x="4446588" y="1282700"/>
+            <a:ext cx="1277937" cy="523875"/>
+          </a:xfrm>
+          <a:prstGeom prst="line">
+            <a:avLst/>
+          </a:prstGeom>
+          <a:noFill/>
+          <a:ln w="9525">
+            <a:solidFill>
+              <a:schemeClr val="tx1"/>
+            </a:solidFill>
+            <a:round/>
+            <a:headEnd/>
+            <a:tailEnd type="triangle" w="med" len="med"/>
+          </a:ln>
+          <a:effectLst/>
+        </p:spPr>
+        <p:txBody>
+          <a:bodyPr/>
+          <a:lstStyle/>
+          <a:p>
+            <a:endParaRPr lang="en-US"/>
+          </a:p>
+        </p:txBody>
+      </p:sp>
+      <p:sp>
+        <p:nvSpPr>
+          <p:cNvPr id="16472" name="Rectangle 88"/>
+          <p:cNvSpPr>
+            <a:spLocks noChangeArrowheads="1"/>
+          </p:cNvSpPr>
+          <p:nvPr/>
+        </p:nvSpPr>
+        <p:spPr bwMode="auto">
+          <a:xfrm>
+            <a:off x="1495425" y="995363"/>
+            <a:ext cx="985838" cy="274637"/>
+          </a:xfrm>
+          <a:prstGeom prst="rect">
+            <a:avLst/>
+          </a:prstGeom>
+          <a:noFill/>
+          <a:ln w="9525">
+            <a:noFill/>
+            <a:miter lim="800000"/>
+            <a:headEnd/>
+            <a:tailEnd/>
+          </a:ln>
+          <a:effectLst/>
+        </p:spPr>
+        <p:txBody>
+          <a:bodyPr wrap="none">
+            <a:spAutoFit/>
+          </a:bodyPr>
+          <a:lstStyle/>
+          <a:p>
+            <a:pPr defTabSz="914400"/>
+            <a:r>
+              <a:rPr lang="en-US" sz="1200"/>
+              <a:t>output$ratio</a:t>
+            </a:r>
+          </a:p>
+        </p:txBody>
+      </p:sp>
+      <p:sp>
+        <p:nvSpPr>
+          <p:cNvPr id="16473" name="Line 89"/>
+          <p:cNvSpPr>
+            <a:spLocks noChangeShapeType="1"/>
+          </p:cNvSpPr>
+          <p:nvPr/>
+        </p:nvSpPr>
+        <p:spPr bwMode="auto">
+          <a:xfrm>
+            <a:off x="2066925" y="1262063"/>
+            <a:ext cx="808038" cy="542925"/>
+          </a:xfrm>
+          <a:prstGeom prst="line">
+            <a:avLst/>
+          </a:prstGeom>
+          <a:noFill/>
+          <a:ln w="9525">
+            <a:solidFill>
+              <a:schemeClr val="tx1"/>
+            </a:solidFill>
+            <a:round/>
+            <a:headEnd/>
+            <a:tailEnd type="triangle" w="med" len="med"/>
+          </a:ln>
+          <a:effectLst/>
+        </p:spPr>
+        <p:txBody>
+          <a:bodyPr/>
+          <a:lstStyle/>
+          <a:p>
+            <a:endParaRPr lang="en-US"/>
+          </a:p>
+        </p:txBody>
+      </p:sp>
+      <p:sp>
+        <p:nvSpPr>
+          <p:cNvPr id="16474" name="Rectangle 90"/>
+          <p:cNvSpPr>
+            <a:spLocks noChangeArrowheads="1"/>
+          </p:cNvSpPr>
+          <p:nvPr/>
+        </p:nvSpPr>
+        <p:spPr bwMode="auto">
+          <a:xfrm>
+            <a:off x="860425" y="1804988"/>
+            <a:ext cx="1095375" cy="274637"/>
+          </a:xfrm>
+          <a:prstGeom prst="rect">
+            <a:avLst/>
+          </a:prstGeom>
+          <a:noFill/>
+          <a:ln w="9525">
+            <a:noFill/>
+            <a:miter lim="800000"/>
+            <a:headEnd/>
+            <a:tailEnd/>
+          </a:ln>
+          <a:effectLst/>
+        </p:spPr>
+        <p:txBody>
+          <a:bodyPr wrap="none">
+            <a:spAutoFit/>
+          </a:bodyPr>
+          <a:lstStyle/>
+          <a:p>
+            <a:pPr defTabSz="914400"/>
+            <a:r>
+              <a:rPr lang="en-US" sz="1200"/>
+              <a:t>output$saved</a:t>
+            </a:r>
+          </a:p>
+        </p:txBody>
+      </p:sp>
+      <p:sp>
+        <p:nvSpPr>
+          <p:cNvPr id="16475" name="Line 91"/>
+          <p:cNvSpPr>
+            <a:spLocks noChangeShapeType="1"/>
+          </p:cNvSpPr>
+          <p:nvPr/>
+        </p:nvSpPr>
+        <p:spPr bwMode="auto">
+          <a:xfrm flipV="1">
+            <a:off x="1924050" y="1957388"/>
+            <a:ext cx="541338" cy="0"/>
+          </a:xfrm>
+          <a:prstGeom prst="line">
+            <a:avLst/>
+          </a:prstGeom>
+          <a:noFill/>
+          <a:ln w="9525">
+            <a:solidFill>
+              <a:schemeClr val="tx1"/>
+            </a:solidFill>
+            <a:round/>
+            <a:headEnd/>
+            <a:tailEnd type="triangle" w="med" len="med"/>
+          </a:ln>
+          <a:effectLst/>
+        </p:spPr>
+        <p:txBody>
+          <a:bodyPr/>
+          <a:lstStyle/>
+          <a:p>
+            <a:endParaRPr lang="en-US"/>
+          </a:p>
+        </p:txBody>
+      </p:sp>
+      <p:sp>
+        <p:nvSpPr>
+          <p:cNvPr id="16476" name="Rectangle 92"/>
+          <p:cNvSpPr>
+            <a:spLocks noChangeArrowheads="1"/>
+          </p:cNvSpPr>
+          <p:nvPr/>
+        </p:nvSpPr>
+        <p:spPr bwMode="auto">
+          <a:xfrm>
+            <a:off x="831850" y="2582863"/>
+            <a:ext cx="1189038" cy="274637"/>
+          </a:xfrm>
+          <a:prstGeom prst="rect">
+            <a:avLst/>
+          </a:prstGeom>
+          <a:noFill/>
+          <a:ln w="9525">
+            <a:noFill/>
+            <a:miter lim="800000"/>
+            <a:headEnd/>
+            <a:tailEnd/>
+          </a:ln>
+          <a:effectLst/>
+        </p:spPr>
+        <p:txBody>
+          <a:bodyPr wrap="none">
+            <a:spAutoFit/>
+          </a:bodyPr>
+          <a:lstStyle/>
+          <a:p>
+            <a:pPr defTabSz="914400"/>
+            <a:r>
+              <a:rPr lang="en-US" sz="1200"/>
+              <a:t>output$distPlot</a:t>
+            </a:r>
+          </a:p>
+        </p:txBody>
+      </p:sp>
+      <p:sp>
+        <p:nvSpPr>
+          <p:cNvPr id="16477" name="Line 93"/>
+          <p:cNvSpPr>
+            <a:spLocks noChangeShapeType="1"/>
+          </p:cNvSpPr>
+          <p:nvPr/>
+        </p:nvSpPr>
+        <p:spPr bwMode="auto">
+          <a:xfrm flipV="1">
+            <a:off x="1971675" y="2738438"/>
+            <a:ext cx="541338" cy="0"/>
+          </a:xfrm>
+          <a:prstGeom prst="line">
+            <a:avLst/>
+          </a:prstGeom>
+          <a:noFill/>
+          <a:ln w="9525">
+            <a:solidFill>
+              <a:schemeClr val="tx1"/>
+            </a:solidFill>
+            <a:round/>
+            <a:headEnd/>
+            <a:tailEnd type="triangle" w="med" len="med"/>
+          </a:ln>
+          <a:effectLst/>
+        </p:spPr>
+        <p:txBody>
+          <a:bodyPr/>
+          <a:lstStyle/>
+          <a:p>
+            <a:endParaRPr lang="en-US"/>
+          </a:p>
+        </p:txBody>
+      </p:sp>
+      <p:sp>
+        <p:nvSpPr>
+          <p:cNvPr id="16478" name="Rectangle 94"/>
+          <p:cNvSpPr>
+            <a:spLocks noChangeArrowheads="1"/>
+          </p:cNvSpPr>
+          <p:nvPr/>
+        </p:nvSpPr>
+        <p:spPr bwMode="auto">
+          <a:xfrm>
+            <a:off x="908050" y="3357563"/>
+            <a:ext cx="993775" cy="274637"/>
+          </a:xfrm>
+          <a:prstGeom prst="rect">
+            <a:avLst/>
+          </a:prstGeom>
+          <a:noFill/>
+          <a:ln w="9525">
+            <a:noFill/>
+            <a:miter lim="800000"/>
+            <a:headEnd/>
+            <a:tailEnd/>
+          </a:ln>
+          <a:effectLst/>
+        </p:spPr>
+        <p:txBody>
+          <a:bodyPr wrap="none">
+            <a:spAutoFit/>
+          </a:bodyPr>
+          <a:lstStyle/>
+          <a:p>
+            <a:pPr defTabSz="914400"/>
+            <a:r>
+              <a:rPr lang="en-US" sz="1200"/>
+              <a:t>output$view</a:t>
+            </a:r>
+          </a:p>
+        </p:txBody>
+      </p:sp>
+      <p:sp>
+        <p:nvSpPr>
+          <p:cNvPr id="16479" name="Line 95"/>
+          <p:cNvSpPr>
+            <a:spLocks noChangeShapeType="1"/>
+          </p:cNvSpPr>
+          <p:nvPr/>
+        </p:nvSpPr>
+        <p:spPr bwMode="auto">
+          <a:xfrm flipV="1">
+            <a:off x="1981200" y="2886075"/>
+            <a:ext cx="676275" cy="600075"/>
+          </a:xfrm>
+          <a:prstGeom prst="line">
+            <a:avLst/>
+          </a:prstGeom>
+          <a:noFill/>
+          <a:ln w="9525">
+            <a:solidFill>
+              <a:schemeClr val="tx1"/>
+            </a:solidFill>
+            <a:round/>
+            <a:headEnd/>
+            <a:tailEnd type="triangle" w="med" len="med"/>
+          </a:ln>
+          <a:effectLst/>
+        </p:spPr>
+        <p:txBody>
+          <a:bodyPr/>
+          <a:lstStyle/>
+          <a:p>
+            <a:endParaRPr lang="en-US"/>
+          </a:p>
+        </p:txBody>
+      </p:sp>
+      <p:sp>
+        <p:nvSpPr>
+          <p:cNvPr id="16480" name="Line 96"/>
+          <p:cNvSpPr>
+            <a:spLocks noChangeShapeType="1"/>
+          </p:cNvSpPr>
+          <p:nvPr/>
+        </p:nvSpPr>
+        <p:spPr bwMode="auto">
+          <a:xfrm>
+            <a:off x="3476625" y="2752725"/>
+            <a:ext cx="457200" cy="0"/>
+          </a:xfrm>
+          <a:prstGeom prst="line">
+            <a:avLst/>
+          </a:prstGeom>
+          <a:noFill/>
+          <a:ln w="9525">
+            <a:solidFill>
+              <a:schemeClr val="tx1"/>
+            </a:solidFill>
+            <a:round/>
+            <a:headEnd/>
+            <a:tailEnd type="triangle" w="med" len="med"/>
+          </a:ln>
+          <a:effectLst/>
+        </p:spPr>
+        <p:txBody>
+          <a:bodyPr/>
+          <a:lstStyle/>
+          <a:p>
+            <a:endParaRPr lang="en-US"/>
+          </a:p>
+        </p:txBody>
+      </p:sp>
+      <p:sp>
+        <p:nvSpPr>
+          <p:cNvPr id="16482" name="Line 98"/>
+          <p:cNvSpPr>
+            <a:spLocks noChangeShapeType="1"/>
+          </p:cNvSpPr>
+          <p:nvPr/>
+        </p:nvSpPr>
+        <p:spPr bwMode="auto">
+          <a:xfrm flipH="1">
+            <a:off x="4724400" y="2752725"/>
+            <a:ext cx="2057400" cy="0"/>
+          </a:xfrm>
+          <a:prstGeom prst="line">
+            <a:avLst/>
+          </a:prstGeom>
+          <a:noFill/>
+          <a:ln w="9525">
+            <a:solidFill>
+              <a:schemeClr val="tx1"/>
+            </a:solidFill>
+            <a:round/>
+            <a:headEnd/>
+            <a:tailEnd type="triangle" w="med" len="med"/>
+          </a:ln>
+          <a:effectLst/>
+        </p:spPr>
+        <p:txBody>
+          <a:bodyPr/>
+          <a:lstStyle/>
+          <a:p>
+            <a:endParaRPr lang="en-US"/>
+          </a:p>
+        </p:txBody>
+      </p:sp>
+      <p:sp>
+        <p:nvSpPr>
+          <p:cNvPr id="16483" name="AutoShape 99"/>
+          <p:cNvSpPr>
+            <a:spLocks noChangeArrowheads="1"/>
+          </p:cNvSpPr>
+          <p:nvPr/>
+        </p:nvSpPr>
+        <p:spPr bwMode="auto">
+          <a:xfrm>
+            <a:off x="3676650" y="3676650"/>
+            <a:ext cx="1247775" cy="719138"/>
+          </a:xfrm>
+          <a:prstGeom prst="can">
+            <a:avLst>
+              <a:gd name="adj" fmla="val 25000"/>
+            </a:avLst>
+          </a:prstGeom>
+          <a:solidFill>
+            <a:schemeClr val="accent1"/>
+          </a:solidFill>
           <a:ln w="9525">
             <a:solidFill>
               <a:schemeClr val="tx1"/>
@@ -27588,23 +27390,135 @@
             <a:pPr algn="ctr" defTabSz="914400"/>
             <a:r>
               <a:rPr lang="en-US" sz="1200"/>
-              <a:t>Display</a:t>
+              <a:t>MS SQL Server</a:t>
+            </a:r>
+          </a:p>
+          <a:p>
+            <a:pPr algn="ctr" defTabSz="914400"/>
+            <a:r>
+              <a:rPr lang="en-US" sz="1200"/>
+              <a:t>Database</a:t>
             </a:r>
           </a:p>
         </p:txBody>
       </p:sp>
       <p:sp>
         <p:nvSpPr>
-          <p:cNvPr id="24585" name="Line 9"/>
+          <p:cNvPr id="16485" name="Line 101"/>
           <p:cNvSpPr>
             <a:spLocks noChangeShapeType="1"/>
           </p:cNvSpPr>
           <p:nvPr/>
         </p:nvSpPr>
         <p:spPr bwMode="auto">
-          <a:xfrm>
-            <a:off x="4662488" y="1638300"/>
-            <a:ext cx="1225550" cy="0"/>
+          <a:xfrm flipH="1" flipV="1">
+            <a:off x="6276975" y="2066925"/>
+            <a:ext cx="590550" cy="523875"/>
+          </a:xfrm>
+          <a:prstGeom prst="line">
+            <a:avLst/>
+          </a:prstGeom>
+          <a:noFill/>
+          <a:ln w="9525">
+            <a:solidFill>
+              <a:schemeClr val="tx1"/>
+            </a:solidFill>
+            <a:round/>
+            <a:headEnd/>
+            <a:tailEnd type="triangle" w="med" len="med"/>
+          </a:ln>
+          <a:effectLst/>
+        </p:spPr>
+        <p:txBody>
+          <a:bodyPr/>
+          <a:lstStyle/>
+          <a:p>
+            <a:endParaRPr lang="en-US"/>
+          </a:p>
+        </p:txBody>
+      </p:sp>
+      <p:sp>
+        <p:nvSpPr>
+          <p:cNvPr id="16486" name="Line 102"/>
+          <p:cNvSpPr>
+            <a:spLocks noChangeShapeType="1"/>
+          </p:cNvSpPr>
+          <p:nvPr/>
+        </p:nvSpPr>
+        <p:spPr bwMode="auto">
+          <a:xfrm flipH="1" flipV="1">
+            <a:off x="5305425" y="2076450"/>
+            <a:ext cx="1504950" cy="581025"/>
+          </a:xfrm>
+          <a:prstGeom prst="line">
+            <a:avLst/>
+          </a:prstGeom>
+          <a:noFill/>
+          <a:ln w="9525">
+            <a:solidFill>
+              <a:schemeClr val="tx1"/>
+            </a:solidFill>
+            <a:round/>
+            <a:headEnd/>
+            <a:tailEnd type="triangle" w="med" len="med"/>
+          </a:ln>
+          <a:effectLst/>
+        </p:spPr>
+        <p:txBody>
+          <a:bodyPr/>
+          <a:lstStyle/>
+          <a:p>
+            <a:endParaRPr lang="en-US"/>
+          </a:p>
+        </p:txBody>
+      </p:sp>
+      <p:sp>
+        <p:nvSpPr>
+          <p:cNvPr id="16487" name="Line 103"/>
+          <p:cNvSpPr>
+            <a:spLocks noChangeShapeType="1"/>
+          </p:cNvSpPr>
+          <p:nvPr/>
+        </p:nvSpPr>
+        <p:spPr bwMode="auto">
+          <a:xfrm flipV="1">
+            <a:off x="3448050" y="2028825"/>
+            <a:ext cx="1476375" cy="619125"/>
+          </a:xfrm>
+          <a:prstGeom prst="line">
+            <a:avLst/>
+          </a:prstGeom>
+          <a:noFill/>
+          <a:ln w="9525">
+            <a:solidFill>
+              <a:schemeClr val="tx1"/>
+            </a:solidFill>
+            <a:round/>
+            <a:headEnd/>
+            <a:tailEnd type="triangle" w="med" len="med"/>
+          </a:ln>
+          <a:effectLst/>
+        </p:spPr>
+        <p:txBody>
+          <a:bodyPr/>
+          <a:lstStyle/>
+          <a:p>
+            <a:endParaRPr lang="en-US"/>
+          </a:p>
+        </p:txBody>
+      </p:sp>
+      <p:sp>
+        <p:nvSpPr>
+          <p:cNvPr id="16488" name="Line 104"/>
+          <p:cNvSpPr>
+            <a:spLocks noChangeShapeType="1"/>
+          </p:cNvSpPr>
+          <p:nvPr/>
+        </p:nvSpPr>
+        <p:spPr bwMode="auto">
+          <a:xfrm flipV="1">
+            <a:off x="3486150" y="2047875"/>
+            <a:ext cx="2552700" cy="666750"/>
           </a:xfrm>
           <a:prstGeom prst="line">
             <a:avLst/>
@@ -27633,10 +27547,17 @@
   <p:clrMapOvr>
     <a:masterClrMapping/>
   </p:clrMapOvr>
+  <p:timing>
+    <p:tnLst>
+      <p:par>
+        <p:cTn id="1" dur="indefinite" restart="never" nodeType="tmRoot"/>
+      </p:par>
+    </p:tnLst>
+  </p:timing>
 </p:sld>
 </file>
 
-<file path=ppt/slides/slide4.xml><?xml version="1.0" encoding="utf-8"?>
+<file path=ppt/slides/slide3.xml><?xml version="1.0" encoding="utf-8"?>
 <p:sld xmlns:a="http://schemas.openxmlformats.org/drawingml/2006/main" xmlns:r="http://schemas.openxmlformats.org/officeDocument/2006/relationships" xmlns:p="http://schemas.openxmlformats.org/presentationml/2006/main">
   <p:cSld>
     <p:spTree>
@@ -27702,7 +27623,7 @@
 </p:sld>
 </file>
 
-<file path=ppt/slides/slide5.xml><?xml version="1.0" encoding="utf-8"?>
+<file path=ppt/slides/slide4.xml><?xml version="1.0" encoding="utf-8"?>
 <p:sld xmlns:a="http://schemas.openxmlformats.org/drawingml/2006/main" xmlns:r="http://schemas.openxmlformats.org/officeDocument/2006/relationships" xmlns:p="http://schemas.openxmlformats.org/presentationml/2006/main">
   <p:cSld>
     <p:spTree>

</xml_diff>